<commit_message>
adding exercise set 1
</commit_message>
<xml_diff>
--- a/intro_to_vim/vim_tutorial.pptx
+++ b/intro_to_vim/vim_tutorial.pptx
@@ -192,6 +192,35 @@
 </p1510:revInfo>
 </file>
 
+<file path=ppt/changesInfos/changesInfo1.xml><?xml version="1.0" encoding="utf-8"?>
+<pc:chgInfo xmlns:a="http://schemas.openxmlformats.org/drawingml/2006/main" xmlns:r="http://schemas.openxmlformats.org/officeDocument/2006/relationships" xmlns:ac="http://schemas.microsoft.com/office/drawing/2013/main/command" xmlns:pc="http://schemas.microsoft.com/office/powerpoint/2013/main/command">
+  <pc:docChgLst>
+    <pc:chgData name="Abraham, Subil" userId="56b022d1-40f7-4093-85c4-91c4ba6d9c47" providerId="ADAL" clId="{D7CF8004-D248-9543-83AC-DAA6461E9073}"/>
+    <pc:docChg chg="modSld">
+      <pc:chgData name="Abraham, Subil" userId="56b022d1-40f7-4093-85c4-91c4ba6d9c47" providerId="ADAL" clId="{D7CF8004-D248-9543-83AC-DAA6461E9073}" dt="2021-12-06T16:27:28.032" v="0" actId="20577"/>
+      <pc:docMkLst>
+        <pc:docMk/>
+      </pc:docMkLst>
+      <pc:sldChg chg="modSp mod">
+        <pc:chgData name="Abraham, Subil" userId="56b022d1-40f7-4093-85c4-91c4ba6d9c47" providerId="ADAL" clId="{D7CF8004-D248-9543-83AC-DAA6461E9073}" dt="2021-12-06T16:27:28.032" v="0" actId="20577"/>
+        <pc:sldMkLst>
+          <pc:docMk/>
+          <pc:sldMk cId="1021231792" sldId="727"/>
+        </pc:sldMkLst>
+        <pc:spChg chg="mod">
+          <ac:chgData name="Abraham, Subil" userId="56b022d1-40f7-4093-85c4-91c4ba6d9c47" providerId="ADAL" clId="{D7CF8004-D248-9543-83AC-DAA6461E9073}" dt="2021-12-06T16:27:28.032" v="0" actId="20577"/>
+          <ac:spMkLst>
+            <pc:docMk/>
+            <pc:sldMk cId="1021231792" sldId="727"/>
+            <ac:spMk id="3" creationId="{002D09DB-0593-1D45-8D24-D99B939DEB6B}"/>
+          </ac:spMkLst>
+        </pc:spChg>
+      </pc:sldChg>
+    </pc:docChg>
+  </pc:docChgLst>
+</pc:chgInfo>
+</file>
+
 <file path=ppt/handoutMasters/handoutMaster1.xml><?xml version="1.0" encoding="utf-8"?>
 <p:handoutMaster xmlns:a="http://schemas.openxmlformats.org/drawingml/2006/main" xmlns:r="http://schemas.openxmlformats.org/officeDocument/2006/relationships" xmlns:p="http://schemas.openxmlformats.org/presentationml/2006/main">
   <p:cSld>
@@ -274,7 +303,7 @@
           <a:p>
             <a:fld id="{0B842F42-2CE9-4E35-95C1-410DC08A50B1}" type="datetimeFigureOut">
               <a:rPr lang="en-US" smtClean="0"/>
-              <a:t>11/29/21</a:t>
+              <a:t>12/6/21</a:t>
             </a:fld>
             <a:endParaRPr lang="en-US"/>
           </a:p>
@@ -439,7 +468,7 @@
           <a:p>
             <a:fld id="{6F282904-F315-4730-8D91-37D99E141A6F}" type="datetimeFigureOut">
               <a:rPr lang="en-US" smtClean="0"/>
-              <a:t>11/29/21</a:t>
+              <a:t>12/6/21</a:t>
             </a:fld>
             <a:endParaRPr lang="en-US"/>
           </a:p>
@@ -1426,7 +1455,7 @@
           <a:noFill/>
           <a:extLst>
             <a:ext uri="{909E8E84-426E-40dd-AFC4-6F175D3DCCD1}">
-              <a14:hiddenFill xmlns:a14="http://schemas.microsoft.com/office/drawing/2010/main" xmlns="">
+              <a14:hiddenFill xmlns="" xmlns:a14="http://schemas.microsoft.com/office/drawing/2010/main">
                 <a:solidFill>
                   <a:srgbClr val="FFFFFF"/>
                 </a:solidFill>
@@ -1640,7 +1669,7 @@
           <a:p>
             <a:fld id="{E34CD74F-6CCB-224F-86C9-31E8FC4F9F32}" type="datetimeFigureOut">
               <a:rPr lang="en-US" smtClean="0"/>
-              <a:t>11/29/21</a:t>
+              <a:t>12/6/21</a:t>
             </a:fld>
             <a:endParaRPr lang="en-US"/>
           </a:p>
@@ -2052,7 +2081,7 @@
           <a:p>
             <a:fld id="{E34CD74F-6CCB-224F-86C9-31E8FC4F9F32}" type="datetimeFigureOut">
               <a:rPr lang="en-US" smtClean="0"/>
-              <a:t>11/29/21</a:t>
+              <a:t>12/6/21</a:t>
             </a:fld>
             <a:endParaRPr lang="en-US"/>
           </a:p>
@@ -2193,7 +2222,7 @@
           <a:p>
             <a:fld id="{E34CD74F-6CCB-224F-86C9-31E8FC4F9F32}" type="datetimeFigureOut">
               <a:rPr lang="en-US" smtClean="0"/>
-              <a:t>11/29/21</a:t>
+              <a:t>12/6/21</a:t>
             </a:fld>
             <a:endParaRPr lang="en-US"/>
           </a:p>
@@ -2306,7 +2335,7 @@
           <a:p>
             <a:fld id="{E34CD74F-6CCB-224F-86C9-31E8FC4F9F32}" type="datetimeFigureOut">
               <a:rPr lang="en-US" smtClean="0"/>
-              <a:t>11/29/21</a:t>
+              <a:t>12/6/21</a:t>
             </a:fld>
             <a:endParaRPr lang="en-US"/>
           </a:p>
@@ -2617,7 +2646,7 @@
           <a:p>
             <a:fld id="{E34CD74F-6CCB-224F-86C9-31E8FC4F9F32}" type="datetimeFigureOut">
               <a:rPr lang="en-US" smtClean="0"/>
-              <a:t>11/29/21</a:t>
+              <a:t>12/6/21</a:t>
             </a:fld>
             <a:endParaRPr lang="en-US"/>
           </a:p>
@@ -2905,7 +2934,7 @@
           <a:p>
             <a:fld id="{E34CD74F-6CCB-224F-86C9-31E8FC4F9F32}" type="datetimeFigureOut">
               <a:rPr lang="en-US" smtClean="0"/>
-              <a:t>11/29/21</a:t>
+              <a:t>12/6/21</a:t>
             </a:fld>
             <a:endParaRPr lang="en-US"/>
           </a:p>
@@ -3103,7 +3132,7 @@
           <a:p>
             <a:fld id="{E34CD74F-6CCB-224F-86C9-31E8FC4F9F32}" type="datetimeFigureOut">
               <a:rPr lang="en-US" smtClean="0"/>
-              <a:t>11/29/21</a:t>
+              <a:t>12/6/21</a:t>
             </a:fld>
             <a:endParaRPr lang="en-US"/>
           </a:p>
@@ -3311,7 +3340,7 @@
           <a:p>
             <a:fld id="{E34CD74F-6CCB-224F-86C9-31E8FC4F9F32}" type="datetimeFigureOut">
               <a:rPr lang="en-US" smtClean="0"/>
-              <a:t>11/29/21</a:t>
+              <a:t>12/6/21</a:t>
             </a:fld>
             <a:endParaRPr lang="en-US"/>
           </a:p>
@@ -4241,7 +4270,7 @@
           <a:noFill/>
           <a:extLst>
             <a:ext uri="{909E8E84-426E-40dd-AFC4-6F175D3DCCD1}">
-              <a14:hiddenFill xmlns:a14="http://schemas.microsoft.com/office/drawing/2010/main" xmlns="">
+              <a14:hiddenFill xmlns="" xmlns:a14="http://schemas.microsoft.com/office/drawing/2010/main">
                 <a:solidFill>
                   <a:srgbClr val="FFFFFF"/>
                 </a:solidFill>
@@ -4362,7 +4391,7 @@
           <a:p>
             <a:fld id="{83D21A5F-A782-4E19-A2C2-3F5DE93587DD}" type="datetimeFigureOut">
               <a:rPr lang="en-US" smtClean="0"/>
-              <a:t>11/29/21</a:t>
+              <a:t>12/6/21</a:t>
             </a:fld>
             <a:endParaRPr lang="en-US"/>
           </a:p>
@@ -4807,7 +4836,7 @@
           <a:p>
             <a:fld id="{E34CD74F-6CCB-224F-86C9-31E8FC4F9F32}" type="datetimeFigureOut">
               <a:rPr lang="en-US" smtClean="0"/>
-              <a:t>11/29/21</a:t>
+              <a:t>12/6/21</a:t>
             </a:fld>
             <a:endParaRPr lang="en-US"/>
           </a:p>
@@ -5005,7 +5034,7 @@
           <a:p>
             <a:fld id="{E34CD74F-6CCB-224F-86C9-31E8FC4F9F32}" type="datetimeFigureOut">
               <a:rPr lang="en-US" smtClean="0"/>
-              <a:t>11/29/21</a:t>
+              <a:t>12/6/21</a:t>
             </a:fld>
             <a:endParaRPr lang="en-US"/>
           </a:p>
@@ -5280,7 +5309,7 @@
           <a:p>
             <a:fld id="{E34CD74F-6CCB-224F-86C9-31E8FC4F9F32}" type="datetimeFigureOut">
               <a:rPr lang="en-US" smtClean="0"/>
-              <a:t>11/29/21</a:t>
+              <a:t>12/6/21</a:t>
             </a:fld>
             <a:endParaRPr lang="en-US"/>
           </a:p>
@@ -5589,7 +5618,7 @@
           <a:noFill/>
           <a:extLst>
             <a:ext uri="{909E8E84-426E-40dd-AFC4-6F175D3DCCD1}">
-              <a14:hiddenFill xmlns:a14="http://schemas.microsoft.com/office/drawing/2010/main" xmlns="">
+              <a14:hiddenFill xmlns="" xmlns:a14="http://schemas.microsoft.com/office/drawing/2010/main">
                 <a:solidFill>
                   <a:srgbClr val="FFFFFF"/>
                 </a:solidFill>
@@ -6221,7 +6250,7 @@
           <a:p>
             <a:fld id="{E34CD74F-6CCB-224F-86C9-31E8FC4F9F32}" type="datetimeFigureOut">
               <a:rPr lang="en-US" smtClean="0"/>
-              <a:t>11/29/21</a:t>
+              <a:t>12/6/21</a:t>
             </a:fld>
             <a:endParaRPr lang="en-US"/>
           </a:p>
@@ -6974,15 +7003,15 @@
           <a:p>
             <a:r>
               <a:rPr lang="en-US" sz="2400" dirty="0"/>
-              <a:t>“Vim is a highly configurable text editor built to enable efficient text editing. It is an improved version of the vi editor </a:t>
-            </a:r>
-            <a:r>
-              <a:rPr lang="en-US" sz="2400" dirty="0" err="1"/>
-              <a:t>distributerd</a:t>
+              <a:t>“Vim is a highly configurable text editor built to enable efficient text editing. It is an improved version of the vi </a:t>
+            </a:r>
+            <a:r>
+              <a:rPr lang="en-US" sz="2400"/>
+              <a:t>editor distributed </a:t>
             </a:r>
             <a:r>
               <a:rPr lang="en-US" sz="2400" dirty="0"/>
-              <a:t> with most UNIX systems”</a:t>
+              <a:t>with most UNIX systems”</a:t>
             </a:r>
           </a:p>
           <a:p>
@@ -8714,6 +8743,15 @@
 </file>
 
 <file path=customXml/item2.xml><?xml version="1.0" encoding="utf-8"?>
+<?mso-contentType ?>
+<FormTemplates xmlns="http://schemas.microsoft.com/sharepoint/v3/contenttype/forms">
+  <Display>DocumentLibraryForm</Display>
+  <Edit>DocumentLibraryForm</Edit>
+  <New>DocumentLibraryForm</New>
+</FormTemplates>
+</file>
+
+<file path=customXml/item3.xml><?xml version="1.0" encoding="utf-8"?>
 <ct:contentTypeSchema xmlns:ct="http://schemas.microsoft.com/office/2006/metadata/contentType" xmlns:ma="http://schemas.microsoft.com/office/2006/metadata/properties/metaAttributes" ct:_="" ma:_="" ma:contentTypeName="Document" ma:contentTypeID="0x0101003975B17BC858B94FAA5409F11FF9B884" ma:contentTypeVersion="0" ma:contentTypeDescription="Create a new document." ma:contentTypeScope="" ma:versionID="ba30602e445ba7bd833ef2f532e4a594">
   <xsd:schema xmlns:xsd="http://www.w3.org/2001/XMLSchema" xmlns:xs="http://www.w3.org/2001/XMLSchema" xmlns:p="http://schemas.microsoft.com/office/2006/metadata/properties" targetNamespace="http://schemas.microsoft.com/office/2006/metadata/properties" ma:root="true" ma:fieldsID="c64490b4aec6201516c3a874156f37b2">
     <xsd:element name="properties">
@@ -8827,31 +8865,30 @@
 </ct:contentTypeSchema>
 </file>
 
-<file path=customXml/item3.xml><?xml version="1.0" encoding="utf-8"?>
-<?mso-contentType ?>
-<FormTemplates xmlns="http://schemas.microsoft.com/sharepoint/v3/contenttype/forms">
-  <Display>DocumentLibraryForm</Display>
-  <Edit>DocumentLibraryForm</Edit>
-  <New>DocumentLibraryForm</New>
-</FormTemplates>
-</file>
-
 <file path=customXml/itemProps1.xml><?xml version="1.0" encoding="utf-8"?>
 <ds:datastoreItem xmlns:ds="http://schemas.openxmlformats.org/officeDocument/2006/customXml" ds:itemID="{A50EC660-24D0-43A0-AE5E-E274115E726B}">
   <ds:schemaRefs>
+    <ds:schemaRef ds:uri="http://schemas.microsoft.com/office/2006/metadata/properties"/>
+    <ds:schemaRef ds:uri="http://schemas.microsoft.com/office/2006/documentManagement/types"/>
+    <ds:schemaRef ds:uri="http://purl.org/dc/terms/"/>
+    <ds:schemaRef ds:uri="http://schemas.microsoft.com/office/infopath/2007/PartnerControls"/>
+    <ds:schemaRef ds:uri="http://purl.org/dc/elements/1.1/"/>
+    <ds:schemaRef ds:uri="http://www.w3.org/XML/1998/namespace"/>
     <ds:schemaRef ds:uri="http://schemas.openxmlformats.org/package/2006/metadata/core-properties"/>
-    <ds:schemaRef ds:uri="http://schemas.microsoft.com/office/2006/metadata/properties"/>
     <ds:schemaRef ds:uri="http://purl.org/dc/dcmitype/"/>
-    <ds:schemaRef ds:uri="http://purl.org/dc/elements/1.1/"/>
-    <ds:schemaRef ds:uri="http://schemas.microsoft.com/office/infopath/2007/PartnerControls"/>
-    <ds:schemaRef ds:uri="http://schemas.microsoft.com/office/2006/documentManagement/types"/>
-    <ds:schemaRef ds:uri="http://www.w3.org/XML/1998/namespace"/>
-    <ds:schemaRef ds:uri="http://purl.org/dc/terms/"/>
   </ds:schemaRefs>
 </ds:datastoreItem>
 </file>
 
 <file path=customXml/itemProps2.xml><?xml version="1.0" encoding="utf-8"?>
+<ds:datastoreItem xmlns:ds="http://schemas.openxmlformats.org/officeDocument/2006/customXml" ds:itemID="{19E20559-B232-4371-8690-E3D8007EDB82}">
+  <ds:schemaRefs>
+    <ds:schemaRef ds:uri="http://schemas.microsoft.com/sharepoint/v3/contenttype/forms"/>
+  </ds:schemaRefs>
+</ds:datastoreItem>
+</file>
+
+<file path=customXml/itemProps3.xml><?xml version="1.0" encoding="utf-8"?>
 <ds:datastoreItem xmlns:ds="http://schemas.openxmlformats.org/officeDocument/2006/customXml" ds:itemID="{ACBB6CFE-4507-4B02-9220-33DC2E0B4692}">
   <ds:schemaRefs>
     <ds:schemaRef ds:uri="http://schemas.microsoft.com/office/2006/metadata/contentType"/>
@@ -8865,12 +8902,4 @@
     <ds:schemaRef ds:uri="http://schemas.microsoft.com/office/infopath/2007/PartnerControls"/>
   </ds:schemaRefs>
 </ds:datastoreItem>
-</file>
-
-<file path=customXml/itemProps3.xml><?xml version="1.0" encoding="utf-8"?>
-<ds:datastoreItem xmlns:ds="http://schemas.openxmlformats.org/officeDocument/2006/customXml" ds:itemID="{19E20559-B232-4371-8690-E3D8007EDB82}">
-  <ds:schemaRefs>
-    <ds:schemaRef ds:uri="http://schemas.microsoft.com/sharepoint/v3/contenttype/forms"/>
-  </ds:schemaRefs>
-</ds:datastoreItem>
 </file>
</xml_diff>